<commit_message>
my slides added for the presentation
</commit_message>
<xml_diff>
--- a/Documentation/Präsentation.pptx
+++ b/Documentation/Präsentation.pptx
@@ -6,13 +6,16 @@
   </p:sldMasterIdLst>
   <p:sldIdLst>
     <p:sldId id="256" r:id="rId2"/>
-    <p:sldId id="257" r:id="rId3"/>
+    <p:sldId id="264" r:id="rId3"/>
     <p:sldId id="260" r:id="rId4"/>
     <p:sldId id="258" r:id="rId5"/>
     <p:sldId id="259" r:id="rId6"/>
     <p:sldId id="262" r:id="rId7"/>
-    <p:sldId id="261" r:id="rId8"/>
-    <p:sldId id="263" r:id="rId9"/>
+    <p:sldId id="265" r:id="rId8"/>
+    <p:sldId id="266" r:id="rId9"/>
+    <p:sldId id="261" r:id="rId10"/>
+    <p:sldId id="263" r:id="rId11"/>
+    <p:sldId id="267" r:id="rId12"/>
   </p:sldIdLst>
   <p:sldSz cx="12192000" cy="6858000"/>
   <p:notesSz cx="6858000" cy="9144000"/>
@@ -113,7 +116,7 @@
   </p:defaultTextStyle>
   <p:extLst>
     <p:ext uri="{EFAFB233-063F-42B5-8137-9DF3F51BA10A}">
-      <p15:sldGuideLst xmlns:p15="http://schemas.microsoft.com/office/powerpoint/2012/main">
+      <p15:sldGuideLst xmlns:p15="http://schemas.microsoft.com/office/powerpoint/2012/main" xmlns="">
         <p15:guide id="1" orient="horz" pos="2160">
           <p15:clr>
             <a:srgbClr val="A4A3A4"/>
@@ -6707,10 +6710,688 @@
           </a:p>
         </p:txBody>
       </p:sp>
+      <p:sp>
+        <p:nvSpPr>
+          <p:cNvPr id="4" name="Textfeld 3"/>
+          <p:cNvSpPr txBox="1"/>
+          <p:nvPr/>
+        </p:nvSpPr>
+        <p:spPr>
+          <a:xfrm>
+            <a:off x="110359" y="6353504"/>
+            <a:ext cx="3110403" cy="369332"/>
+          </a:xfrm>
+          <a:prstGeom prst="rect">
+            <a:avLst/>
+          </a:prstGeom>
+          <a:noFill/>
+        </p:spPr>
+        <p:txBody>
+          <a:bodyPr wrap="none" rtlCol="0">
+            <a:spAutoFit/>
+          </a:bodyPr>
+          <a:lstStyle/>
+          <a:p>
+            <a:r>
+              <a:rPr lang="de-DE" dirty="0" smtClean="0">
+                <a:solidFill>
+                  <a:schemeClr val="bg1">
+                    <a:lumMod val="50000"/>
+                  </a:schemeClr>
+                </a:solidFill>
+              </a:rPr>
+              <a:t>Multiagent </a:t>
+            </a:r>
+            <a:r>
+              <a:rPr lang="de-DE" dirty="0" err="1" smtClean="0">
+                <a:solidFill>
+                  <a:schemeClr val="bg1">
+                    <a:lumMod val="50000"/>
+                  </a:schemeClr>
+                </a:solidFill>
+              </a:rPr>
+              <a:t>and</a:t>
+            </a:r>
+            <a:r>
+              <a:rPr lang="de-DE" dirty="0" smtClean="0">
+                <a:solidFill>
+                  <a:schemeClr val="bg1">
+                    <a:lumMod val="50000"/>
+                  </a:schemeClr>
+                </a:solidFill>
+              </a:rPr>
+              <a:t> Agent Systems</a:t>
+            </a:r>
+            <a:endParaRPr lang="de-DE" dirty="0">
+              <a:solidFill>
+                <a:schemeClr val="bg1">
+                  <a:lumMod val="50000"/>
+                </a:schemeClr>
+              </a:solidFill>
+            </a:endParaRPr>
+          </a:p>
+        </p:txBody>
+      </p:sp>
+      <p:sp>
+        <p:nvSpPr>
+          <p:cNvPr id="6" name="Textfeld 5"/>
+          <p:cNvSpPr txBox="1"/>
+          <p:nvPr/>
+        </p:nvSpPr>
+        <p:spPr>
+          <a:xfrm>
+            <a:off x="10872622" y="6353504"/>
+            <a:ext cx="1199687" cy="369332"/>
+          </a:xfrm>
+          <a:prstGeom prst="rect">
+            <a:avLst/>
+          </a:prstGeom>
+          <a:noFill/>
+        </p:spPr>
+        <p:txBody>
+          <a:bodyPr wrap="none" rtlCol="0">
+            <a:spAutoFit/>
+          </a:bodyPr>
+          <a:lstStyle/>
+          <a:p>
+            <a:r>
+              <a:rPr lang="de-DE" dirty="0" smtClean="0">
+                <a:solidFill>
+                  <a:schemeClr val="bg1">
+                    <a:lumMod val="50000"/>
+                  </a:schemeClr>
+                </a:solidFill>
+              </a:rPr>
+              <a:t>21.01.2015</a:t>
+            </a:r>
+            <a:endParaRPr lang="de-DE" dirty="0">
+              <a:solidFill>
+                <a:schemeClr val="bg1">
+                  <a:lumMod val="50000"/>
+                </a:schemeClr>
+              </a:solidFill>
+            </a:endParaRPr>
+          </a:p>
+        </p:txBody>
+      </p:sp>
     </p:spTree>
     <p:extLst>
       <p:ext uri="{BB962C8B-B14F-4D97-AF65-F5344CB8AC3E}">
         <p14:creationId xmlns:p14="http://schemas.microsoft.com/office/powerpoint/2010/main" val="2628677086"/>
+      </p:ext>
+    </p:extLst>
+  </p:cSld>
+  <p:clrMapOvr>
+    <a:masterClrMapping/>
+  </p:clrMapOvr>
+  <p:timing>
+    <p:tnLst>
+      <p:par>
+        <p:cTn id="1" dur="indefinite" restart="never" nodeType="tmRoot"/>
+      </p:par>
+    </p:tnLst>
+  </p:timing>
+</p:sld>
+</file>
+
+<file path=ppt/slides/slide10.xml><?xml version="1.0" encoding="utf-8"?>
+<p:sld xmlns:a="http://schemas.openxmlformats.org/drawingml/2006/main" xmlns:r="http://schemas.openxmlformats.org/officeDocument/2006/relationships" xmlns:p="http://schemas.openxmlformats.org/presentationml/2006/main">
+  <p:cSld>
+    <p:spTree>
+      <p:nvGrpSpPr>
+        <p:cNvPr id="1" name=""/>
+        <p:cNvGrpSpPr/>
+        <p:nvPr/>
+      </p:nvGrpSpPr>
+      <p:grpSpPr>
+        <a:xfrm>
+          <a:off x="0" y="0"/>
+          <a:ext cx="0" cy="0"/>
+          <a:chOff x="0" y="0"/>
+          <a:chExt cx="0" cy="0"/>
+        </a:xfrm>
+      </p:grpSpPr>
+      <p:sp>
+        <p:nvSpPr>
+          <p:cNvPr id="2" name="Titel 1"/>
+          <p:cNvSpPr>
+            <a:spLocks noGrp="1"/>
+          </p:cNvSpPr>
+          <p:nvPr>
+            <p:ph type="title"/>
+          </p:nvPr>
+        </p:nvSpPr>
+        <p:spPr/>
+        <p:txBody>
+          <a:bodyPr/>
+          <a:lstStyle/>
+          <a:p>
+            <a:r>
+              <a:rPr lang="de-DE" dirty="0" err="1" smtClean="0"/>
+              <a:t>Configuration</a:t>
+            </a:r>
+            <a:endParaRPr lang="en-GB" dirty="0"/>
+          </a:p>
+        </p:txBody>
+      </p:sp>
+      <p:sp>
+        <p:nvSpPr>
+          <p:cNvPr id="3" name="Inhaltsplatzhalter 2"/>
+          <p:cNvSpPr>
+            <a:spLocks noGrp="1"/>
+          </p:cNvSpPr>
+          <p:nvPr>
+            <p:ph idx="1"/>
+          </p:nvPr>
+        </p:nvSpPr>
+        <p:spPr/>
+        <p:txBody>
+          <a:bodyPr>
+            <a:normAutofit lnSpcReduction="10000"/>
+          </a:bodyPr>
+          <a:lstStyle/>
+          <a:p>
+            <a:pPr marL="0" indent="0">
+              <a:buNone/>
+            </a:pPr>
+            <a:r>
+              <a:rPr lang="de-DE" dirty="0" smtClean="0"/>
+              <a:t>{</a:t>
+            </a:r>
+          </a:p>
+          <a:p>
+            <a:pPr marL="0" indent="0">
+              <a:buNone/>
+            </a:pPr>
+            <a:r>
+              <a:rPr lang="de-DE" dirty="0"/>
+              <a:t>	</a:t>
+            </a:r>
+            <a:r>
+              <a:rPr lang="de-DE" dirty="0" err="1" smtClean="0"/>
+              <a:t>shelves</a:t>
+            </a:r>
+            <a:r>
+              <a:rPr lang="de-DE" dirty="0" smtClean="0"/>
+              <a:t>: [ {uid:0, </a:t>
+            </a:r>
+            <a:r>
+              <a:rPr lang="de-DE" dirty="0" err="1" smtClean="0"/>
+              <a:t>products</a:t>
+            </a:r>
+            <a:r>
+              <a:rPr lang="de-DE" dirty="0" smtClean="0"/>
+              <a:t>:[</a:t>
+            </a:r>
+          </a:p>
+          <a:p>
+            <a:pPr marL="0" indent="0">
+              <a:buNone/>
+            </a:pPr>
+            <a:r>
+              <a:rPr lang="de-DE" dirty="0"/>
+              <a:t>	</a:t>
+            </a:r>
+            <a:r>
+              <a:rPr lang="de-DE" dirty="0" smtClean="0"/>
+              <a:t>	{name:“</a:t>
+            </a:r>
+            <a:r>
+              <a:rPr lang="de-DE" dirty="0" err="1" smtClean="0"/>
+              <a:t>x“,stock</a:t>
+            </a:r>
+            <a:r>
+              <a:rPr lang="de-DE" dirty="0" smtClean="0"/>
+              <a:t>:{current:10}},</a:t>
+            </a:r>
+          </a:p>
+          <a:p>
+            <a:pPr marL="0" indent="0">
+              <a:buNone/>
+            </a:pPr>
+            <a:r>
+              <a:rPr lang="de-DE" dirty="0"/>
+              <a:t>	</a:t>
+            </a:r>
+            <a:r>
+              <a:rPr lang="de-DE" dirty="0" smtClean="0"/>
+              <a:t>	{</a:t>
+            </a:r>
+            <a:r>
+              <a:rPr lang="de-DE" dirty="0" err="1" smtClean="0"/>
+              <a:t>name</a:t>
+            </a:r>
+            <a:r>
+              <a:rPr lang="de-DE" dirty="0" smtClean="0"/>
+              <a:t>:“</a:t>
+            </a:r>
+            <a:r>
+              <a:rPr lang="de-DE" dirty="0" err="1" smtClean="0"/>
+              <a:t>y“,stock</a:t>
+            </a:r>
+            <a:r>
+              <a:rPr lang="de-DE" dirty="0" smtClean="0"/>
+              <a:t>:{current:10}}</a:t>
+            </a:r>
+          </a:p>
+          <a:p>
+            <a:pPr marL="0" indent="0">
+              <a:buNone/>
+            </a:pPr>
+            <a:r>
+              <a:rPr lang="de-DE" dirty="0"/>
+              <a:t>	</a:t>
+            </a:r>
+            <a:r>
+              <a:rPr lang="de-DE" dirty="0" smtClean="0"/>
+              <a:t>]}],</a:t>
+            </a:r>
+          </a:p>
+          <a:p>
+            <a:pPr marL="0" indent="0">
+              <a:buNone/>
+            </a:pPr>
+            <a:r>
+              <a:rPr lang="de-DE" dirty="0"/>
+              <a:t>	</a:t>
+            </a:r>
+            <a:r>
+              <a:rPr lang="de-DE" dirty="0" err="1" smtClean="0"/>
+              <a:t>pickers</a:t>
+            </a:r>
+            <a:r>
+              <a:rPr lang="de-DE" dirty="0" smtClean="0"/>
+              <a:t>: [{uid:0}, {uid:1}],</a:t>
+            </a:r>
+          </a:p>
+          <a:p>
+            <a:pPr marL="0" indent="0">
+              <a:buNone/>
+            </a:pPr>
+            <a:r>
+              <a:rPr lang="de-DE" dirty="0"/>
+              <a:t>	</a:t>
+            </a:r>
+            <a:r>
+              <a:rPr lang="de-DE" dirty="0" err="1" smtClean="0"/>
+              <a:t>robots</a:t>
+            </a:r>
+            <a:r>
+              <a:rPr lang="de-DE" dirty="0" smtClean="0"/>
+              <a:t>: [{uid:0}, {uid:1}],</a:t>
+            </a:r>
+          </a:p>
+          <a:p>
+            <a:pPr marL="0" indent="0">
+              <a:buNone/>
+            </a:pPr>
+            <a:r>
+              <a:rPr lang="de-DE" dirty="0"/>
+              <a:t>	</a:t>
+            </a:r>
+            <a:r>
+              <a:rPr lang="de-DE" dirty="0" err="1" smtClean="0"/>
+              <a:t>orders</a:t>
+            </a:r>
+            <a:r>
+              <a:rPr lang="de-DE" dirty="0" smtClean="0"/>
+              <a:t>: [{uid:0, </a:t>
+            </a:r>
+            <a:r>
+              <a:rPr lang="de-DE" dirty="0" err="1" smtClean="0"/>
+              <a:t>products</a:t>
+            </a:r>
+            <a:r>
+              <a:rPr lang="de-DE" dirty="0" smtClean="0"/>
+              <a:t>:[</a:t>
+            </a:r>
+          </a:p>
+          <a:p>
+            <a:pPr marL="0" indent="0">
+              <a:buNone/>
+            </a:pPr>
+            <a:r>
+              <a:rPr lang="de-DE" dirty="0"/>
+              <a:t>	</a:t>
+            </a:r>
+            <a:r>
+              <a:rPr lang="de-DE" dirty="0" smtClean="0"/>
+              <a:t>	{</a:t>
+            </a:r>
+            <a:r>
+              <a:rPr lang="de-DE" dirty="0" err="1" smtClean="0"/>
+              <a:t>name</a:t>
+            </a:r>
+            <a:r>
+              <a:rPr lang="de-DE" dirty="0" smtClean="0"/>
+              <a:t>:“x“, quantity:1},</a:t>
+            </a:r>
+          </a:p>
+          <a:p>
+            <a:pPr marL="0" indent="0">
+              <a:buNone/>
+            </a:pPr>
+            <a:r>
+              <a:rPr lang="de-DE" dirty="0"/>
+              <a:t>	</a:t>
+            </a:r>
+            <a:r>
+              <a:rPr lang="de-DE" dirty="0" smtClean="0"/>
+              <a:t>	{</a:t>
+            </a:r>
+            <a:r>
+              <a:rPr lang="de-DE" dirty="0" err="1" smtClean="0"/>
+              <a:t>name</a:t>
+            </a:r>
+            <a:r>
+              <a:rPr lang="de-DE" dirty="0" smtClean="0"/>
+              <a:t>:“y“, quantity:3}</a:t>
+            </a:r>
+          </a:p>
+          <a:p>
+            <a:pPr marL="0" indent="0">
+              <a:buNone/>
+            </a:pPr>
+            <a:r>
+              <a:rPr lang="de-DE" dirty="0"/>
+              <a:t>	</a:t>
+            </a:r>
+            <a:r>
+              <a:rPr lang="de-DE" dirty="0" smtClean="0"/>
+              <a:t>]}]</a:t>
+            </a:r>
+          </a:p>
+          <a:p>
+            <a:pPr marL="0" indent="0">
+              <a:buNone/>
+            </a:pPr>
+            <a:r>
+              <a:rPr lang="de-DE" dirty="0"/>
+              <a:t>}</a:t>
+            </a:r>
+            <a:endParaRPr lang="en-GB" dirty="0"/>
+          </a:p>
+        </p:txBody>
+      </p:sp>
+      <p:sp>
+        <p:nvSpPr>
+          <p:cNvPr id="4" name="Textplatzhalter 3"/>
+          <p:cNvSpPr>
+            <a:spLocks noGrp="1"/>
+          </p:cNvSpPr>
+          <p:nvPr>
+            <p:ph type="body" sz="half" idx="2"/>
+          </p:nvPr>
+        </p:nvSpPr>
+        <p:spPr/>
+        <p:txBody>
+          <a:bodyPr/>
+          <a:lstStyle/>
+          <a:p>
+            <a:pPr marL="285750" indent="-285750" algn="l">
+              <a:buFont typeface="Arial" panose="020B0604020202020204" pitchFamily="34" charset="0"/>
+              <a:buChar char="•"/>
+            </a:pPr>
+            <a:r>
+              <a:rPr lang="de-DE" dirty="0" err="1" smtClean="0"/>
+              <a:t>Define</a:t>
+            </a:r>
+            <a:r>
+              <a:rPr lang="de-DE" dirty="0" smtClean="0"/>
+              <a:t> </a:t>
+            </a:r>
+            <a:r>
+              <a:rPr lang="de-DE" dirty="0" err="1" smtClean="0"/>
+              <a:t>kiva.config.json</a:t>
+            </a:r>
+            <a:endParaRPr lang="de-DE" dirty="0"/>
+          </a:p>
+          <a:p>
+            <a:pPr marL="285750" indent="-285750" algn="l">
+              <a:buFont typeface="Arial" panose="020B0604020202020204" pitchFamily="34" charset="0"/>
+              <a:buChar char="•"/>
+            </a:pPr>
+            <a:r>
+              <a:rPr lang="de-DE" dirty="0" smtClean="0"/>
+              <a:t>Execute parse.js </a:t>
+            </a:r>
+            <a:r>
+              <a:rPr lang="de-DE" dirty="0" err="1" smtClean="0"/>
+              <a:t>to</a:t>
+            </a:r>
+            <a:r>
+              <a:rPr lang="de-DE" dirty="0" smtClean="0"/>
+              <a:t> </a:t>
+            </a:r>
+            <a:r>
+              <a:rPr lang="de-DE" dirty="0" err="1" smtClean="0"/>
+              <a:t>get</a:t>
+            </a:r>
+            <a:r>
+              <a:rPr lang="de-DE" dirty="0" smtClean="0"/>
+              <a:t> JADE </a:t>
+            </a:r>
+            <a:r>
+              <a:rPr lang="de-DE" dirty="0" err="1" smtClean="0"/>
+              <a:t>call</a:t>
+            </a:r>
+            <a:endParaRPr lang="en-GB" dirty="0"/>
+          </a:p>
+        </p:txBody>
+      </p:sp>
+    </p:spTree>
+    <p:extLst>
+      <p:ext uri="{BB962C8B-B14F-4D97-AF65-F5344CB8AC3E}">
+        <p14:creationId xmlns:p14="http://schemas.microsoft.com/office/powerpoint/2010/main" val="1592845727"/>
+      </p:ext>
+    </p:extLst>
+  </p:cSld>
+  <p:clrMapOvr>
+    <a:masterClrMapping/>
+  </p:clrMapOvr>
+  <p:timing>
+    <p:tnLst>
+      <p:par>
+        <p:cTn id="1" dur="indefinite" restart="never" nodeType="tmRoot"/>
+      </p:par>
+    </p:tnLst>
+  </p:timing>
+</p:sld>
+</file>
+
+<file path=ppt/slides/slide11.xml><?xml version="1.0" encoding="utf-8"?>
+<p:sld xmlns:a="http://schemas.openxmlformats.org/drawingml/2006/main" xmlns:r="http://schemas.openxmlformats.org/officeDocument/2006/relationships" xmlns:p="http://schemas.openxmlformats.org/presentationml/2006/main">
+  <p:cSld>
+    <p:spTree>
+      <p:nvGrpSpPr>
+        <p:cNvPr id="1" name=""/>
+        <p:cNvGrpSpPr/>
+        <p:nvPr/>
+      </p:nvGrpSpPr>
+      <p:grpSpPr>
+        <a:xfrm>
+          <a:off x="0" y="0"/>
+          <a:ext cx="0" cy="0"/>
+          <a:chOff x="0" y="0"/>
+          <a:chExt cx="0" cy="0"/>
+        </a:xfrm>
+      </p:grpSpPr>
+      <p:sp>
+        <p:nvSpPr>
+          <p:cNvPr id="2" name="Titel 1"/>
+          <p:cNvSpPr>
+            <a:spLocks noGrp="1"/>
+          </p:cNvSpPr>
+          <p:nvPr>
+            <p:ph type="title"/>
+          </p:nvPr>
+        </p:nvSpPr>
+        <p:spPr>
+          <a:xfrm>
+            <a:off x="3389587" y="867102"/>
+            <a:ext cx="5439104" cy="859221"/>
+          </a:xfrm>
+        </p:spPr>
+        <p:txBody>
+          <a:bodyPr>
+            <a:normAutofit/>
+          </a:bodyPr>
+          <a:lstStyle/>
+          <a:p>
+            <a:r>
+              <a:rPr lang="de-DE" sz="3600" dirty="0" err="1" smtClean="0"/>
+              <a:t>Scale-up</a:t>
+            </a:r>
+            <a:r>
+              <a:rPr lang="de-DE" sz="3600" dirty="0" smtClean="0"/>
+              <a:t> </a:t>
+            </a:r>
+            <a:r>
+              <a:rPr lang="de-DE" sz="3600" dirty="0" err="1" smtClean="0"/>
+              <a:t>the</a:t>
+            </a:r>
+            <a:r>
+              <a:rPr lang="de-DE" sz="3600" dirty="0" smtClean="0"/>
+              <a:t> </a:t>
+            </a:r>
+            <a:r>
+              <a:rPr lang="de-DE" sz="3600" dirty="0" err="1" smtClean="0"/>
+              <a:t>system</a:t>
+            </a:r>
+            <a:r>
+              <a:rPr lang="de-DE" sz="3600" dirty="0" smtClean="0"/>
+              <a:t>/ </a:t>
+            </a:r>
+            <a:r>
+              <a:rPr lang="de-DE" sz="3600" dirty="0" err="1" smtClean="0"/>
+              <a:t>limits</a:t>
+            </a:r>
+            <a:endParaRPr lang="en-GB" dirty="0"/>
+          </a:p>
+        </p:txBody>
+      </p:sp>
+      <p:sp>
+        <p:nvSpPr>
+          <p:cNvPr id="12" name="Textplatzhalter 11"/>
+          <p:cNvSpPr>
+            <a:spLocks noGrp="1"/>
+          </p:cNvSpPr>
+          <p:nvPr>
+            <p:ph type="body" sz="half" idx="2"/>
+          </p:nvPr>
+        </p:nvSpPr>
+        <p:spPr>
+          <a:xfrm>
+            <a:off x="1484312" y="1891861"/>
+            <a:ext cx="9898391" cy="4351283"/>
+          </a:xfrm>
+        </p:spPr>
+        <p:txBody>
+          <a:bodyPr anchor="t">
+            <a:normAutofit/>
+          </a:bodyPr>
+          <a:lstStyle/>
+          <a:p>
+            <a:pPr marL="285750" indent="-285750" algn="l">
+              <a:buFont typeface="Arial" panose="020B0604020202020204" pitchFamily="34" charset="0"/>
+              <a:buChar char="•"/>
+            </a:pPr>
+            <a:r>
+              <a:rPr lang="en-GB" sz="2200" dirty="0" smtClean="0"/>
+              <a:t>Scenario: 3 new orders per second, 10 </a:t>
+            </a:r>
+            <a:r>
+              <a:rPr lang="en-GB" sz="2200" dirty="0" err="1" smtClean="0"/>
+              <a:t>orderpickers</a:t>
+            </a:r>
+            <a:r>
+              <a:rPr lang="en-GB" sz="2200" dirty="0" smtClean="0"/>
+              <a:t>, 20 </a:t>
+            </a:r>
+            <a:r>
+              <a:rPr lang="en-GB" sz="2200" dirty="0" err="1" smtClean="0"/>
+              <a:t>shelfs</a:t>
+            </a:r>
+            <a:r>
+              <a:rPr lang="en-GB" sz="2200" dirty="0" smtClean="0"/>
+              <a:t>. How many robots are at least required to process each order without timeout?</a:t>
+            </a:r>
+          </a:p>
+          <a:p>
+            <a:pPr marL="742950" lvl="2" indent="-285750">
+              <a:buFont typeface="Arial" panose="020B0604020202020204" pitchFamily="34" charset="0"/>
+              <a:buChar char="•"/>
+            </a:pPr>
+            <a:r>
+              <a:rPr lang="en-GB" sz="1600" dirty="0"/>
+              <a:t>=&gt; You can not say for </a:t>
+            </a:r>
+            <a:r>
+              <a:rPr lang="en-GB" sz="1600" dirty="0" smtClean="0"/>
+              <a:t>sure, estimate</a:t>
+            </a:r>
+            <a:endParaRPr lang="en-GB" sz="2200" dirty="0" smtClean="0"/>
+          </a:p>
+          <a:p>
+            <a:pPr marL="285750" indent="-285750" algn="l">
+              <a:buFont typeface="Arial" panose="020B0604020202020204" pitchFamily="34" charset="0"/>
+              <a:buChar char="•"/>
+            </a:pPr>
+            <a:r>
+              <a:rPr lang="en-GB" sz="2200" dirty="0" smtClean="0"/>
+              <a:t>Several variables</a:t>
+            </a:r>
+            <a:r>
+              <a:rPr lang="en-GB" sz="2200" dirty="0"/>
+              <a:t> </a:t>
+            </a:r>
+            <a:r>
+              <a:rPr lang="en-GB" sz="2200" dirty="0" smtClean="0"/>
+              <a:t>(number of </a:t>
+            </a:r>
+            <a:r>
+              <a:rPr lang="en-GB" sz="2200" dirty="0" err="1" smtClean="0"/>
+              <a:t>orderpickers</a:t>
+            </a:r>
+            <a:r>
+              <a:rPr lang="en-GB" sz="2200" dirty="0" smtClean="0"/>
+              <a:t>, number of rebroadcasts, interval, robot travel delay, item distribution among </a:t>
+            </a:r>
+            <a:r>
+              <a:rPr lang="en-GB" sz="2200" dirty="0" err="1" smtClean="0"/>
+              <a:t>shelfs</a:t>
+            </a:r>
+            <a:r>
+              <a:rPr lang="en-GB" sz="2200" dirty="0" smtClean="0"/>
+              <a:t>, message queue)</a:t>
+            </a:r>
+          </a:p>
+          <a:p>
+            <a:pPr marL="285750" indent="-285750" algn="l">
+              <a:buFont typeface="Arial" panose="020B0604020202020204" pitchFamily="34" charset="0"/>
+              <a:buChar char="•"/>
+            </a:pPr>
+            <a:r>
+              <a:rPr lang="en-GB" sz="2200" dirty="0" smtClean="0"/>
+              <a:t>Number of robots too low: Very slow order processing? -&gt; No order processing most likely (timeout)</a:t>
+            </a:r>
+          </a:p>
+          <a:p>
+            <a:pPr marL="285750" indent="-285750" algn="l">
+              <a:buFont typeface="Arial" panose="020B0604020202020204" pitchFamily="34" charset="0"/>
+              <a:buChar char="•"/>
+            </a:pPr>
+            <a:r>
+              <a:rPr lang="en-GB" sz="2200" dirty="0" smtClean="0"/>
+              <a:t>Unless you chose “extreme” values for instantiating agents, the system will work</a:t>
+            </a:r>
+          </a:p>
+        </p:txBody>
+      </p:sp>
+    </p:spTree>
+    <p:extLst>
+      <p:ext uri="{BB962C8B-B14F-4D97-AF65-F5344CB8AC3E}">
+        <p14:creationId xmlns:p14="http://schemas.microsoft.com/office/powerpoint/2010/main" val="76207573"/>
       </p:ext>
     </p:extLst>
   </p:cSld>
@@ -6777,9 +7458,16 @@
             <p:ph idx="1"/>
           </p:nvPr>
         </p:nvSpPr>
-        <p:spPr/>
-        <p:txBody>
-          <a:bodyPr/>
+        <p:spPr>
+          <a:xfrm>
+            <a:off x="1484310" y="2128345"/>
+            <a:ext cx="10018713" cy="4130565"/>
+          </a:xfrm>
+        </p:spPr>
+        <p:txBody>
+          <a:bodyPr>
+            <a:normAutofit fontScale="92500" lnSpcReduction="20000"/>
+          </a:bodyPr>
           <a:lstStyle/>
           <a:p>
             <a:r>
@@ -6810,6 +7498,27 @@
           </a:p>
           <a:p>
             <a:r>
+              <a:rPr lang="en-GB" dirty="0" err="1" smtClean="0"/>
+              <a:t>Orderpicker</a:t>
+            </a:r>
+            <a:endParaRPr lang="en-GB" dirty="0" smtClean="0"/>
+          </a:p>
+          <a:p>
+            <a:pPr lvl="1"/>
+            <a:r>
+              <a:rPr lang="en-GB" dirty="0" smtClean="0"/>
+              <a:t>Internal data structure</a:t>
+            </a:r>
+          </a:p>
+          <a:p>
+            <a:pPr lvl="1"/>
+            <a:r>
+              <a:rPr lang="en-GB" dirty="0" smtClean="0"/>
+              <a:t>Control flow</a:t>
+            </a:r>
+          </a:p>
+          <a:p>
+            <a:r>
               <a:rPr lang="en-GB" dirty="0" smtClean="0"/>
               <a:t>Monitoring</a:t>
             </a:r>
@@ -6818,6 +7527,29 @@
             <a:r>
               <a:rPr lang="de-DE" dirty="0" err="1" smtClean="0"/>
               <a:t>Configuration</a:t>
+            </a:r>
+            <a:endParaRPr lang="de-DE" dirty="0" smtClean="0"/>
+          </a:p>
+          <a:p>
+            <a:r>
+              <a:rPr lang="de-DE" dirty="0" err="1" smtClean="0"/>
+              <a:t>Scale-up</a:t>
+            </a:r>
+            <a:r>
+              <a:rPr lang="de-DE" dirty="0" smtClean="0"/>
+              <a:t> </a:t>
+            </a:r>
+            <a:r>
+              <a:rPr lang="de-DE" dirty="0" err="1" smtClean="0"/>
+              <a:t>the</a:t>
+            </a:r>
+            <a:r>
+              <a:rPr lang="de-DE" dirty="0" smtClean="0"/>
+              <a:t> </a:t>
+            </a:r>
+            <a:r>
+              <a:rPr lang="de-DE" dirty="0" err="1" smtClean="0"/>
+              <a:t>system</a:t>
             </a:r>
             <a:endParaRPr lang="en-GB" dirty="0"/>
           </a:p>
@@ -6826,7 +7558,7 @@
     </p:spTree>
     <p:extLst>
       <p:ext uri="{BB962C8B-B14F-4D97-AF65-F5344CB8AC3E}">
-        <p14:creationId xmlns:p14="http://schemas.microsoft.com/office/powerpoint/2010/main" val="2578784452"/>
+        <p14:creationId xmlns:p14="http://schemas.microsoft.com/office/powerpoint/2010/main" val="845674689"/>
       </p:ext>
     </p:extLst>
   </p:cSld>
@@ -7172,11 +7904,7 @@
             <a:pPr algn="l"/>
             <a:r>
               <a:rPr lang="en-GB" dirty="0" smtClean="0"/>
-              <a:t>Order </a:t>
-            </a:r>
-            <a:r>
-              <a:rPr lang="en-GB" dirty="0" smtClean="0"/>
-              <a:t>assignment</a:t>
+              <a:t>Order assignment</a:t>
             </a:r>
           </a:p>
           <a:p>
@@ -7572,6 +8300,401 @@
           <a:lstStyle/>
           <a:p>
             <a:r>
+              <a:rPr lang="de-DE" sz="3600" dirty="0" err="1" smtClean="0"/>
+              <a:t>Orderpicker</a:t>
+            </a:r>
+            <a:endParaRPr lang="en-GB" dirty="0"/>
+          </a:p>
+        </p:txBody>
+      </p:sp>
+      <p:sp>
+        <p:nvSpPr>
+          <p:cNvPr id="12" name="Textplatzhalter 11"/>
+          <p:cNvSpPr>
+            <a:spLocks noGrp="1"/>
+          </p:cNvSpPr>
+          <p:nvPr>
+            <p:ph type="body" sz="half" idx="2"/>
+          </p:nvPr>
+        </p:nvSpPr>
+        <p:spPr>
+          <a:xfrm>
+            <a:off x="1484312" y="2971800"/>
+            <a:ext cx="3549121" cy="2971800"/>
+          </a:xfrm>
+        </p:spPr>
+        <p:txBody>
+          <a:bodyPr anchor="t">
+            <a:normAutofit/>
+          </a:bodyPr>
+          <a:lstStyle/>
+          <a:p>
+            <a:pPr algn="l"/>
+            <a:r>
+              <a:rPr lang="en-GB" dirty="0" smtClean="0"/>
+              <a:t>Internal data structure</a:t>
+            </a:r>
+          </a:p>
+          <a:p>
+            <a:pPr marL="285750" indent="-285750" algn="l">
+              <a:buFont typeface="Arial" panose="020B0604020202020204" pitchFamily="34" charset="0"/>
+              <a:buChar char="•"/>
+            </a:pPr>
+            <a:r>
+              <a:rPr lang="en-GB" dirty="0" smtClean="0"/>
+              <a:t>Item status  enumeration: broadcasted, </a:t>
+            </a:r>
+            <a:r>
+              <a:rPr lang="en-GB" dirty="0" err="1" smtClean="0"/>
+              <a:t>shelf_proposed</a:t>
+            </a:r>
+            <a:r>
+              <a:rPr lang="en-GB" dirty="0" smtClean="0"/>
+              <a:t>, </a:t>
+            </a:r>
+            <a:r>
+              <a:rPr lang="en-GB" dirty="0" err="1" smtClean="0"/>
+              <a:t>shelf_accepted</a:t>
+            </a:r>
+            <a:r>
+              <a:rPr lang="en-GB" dirty="0" smtClean="0"/>
+              <a:t>, property</a:t>
+            </a:r>
+          </a:p>
+          <a:p>
+            <a:pPr marL="285750" indent="-285750" algn="l">
+              <a:buFont typeface="Arial" panose="020B0604020202020204" pitchFamily="34" charset="0"/>
+              <a:buChar char="•"/>
+            </a:pPr>
+            <a:r>
+              <a:rPr lang="en-GB" dirty="0" err="1" smtClean="0"/>
+              <a:t>Hashmap</a:t>
+            </a:r>
+            <a:r>
+              <a:rPr lang="en-GB" dirty="0" smtClean="0"/>
+              <a:t> &lt;item, item status&gt;</a:t>
+            </a:r>
+          </a:p>
+          <a:p>
+            <a:pPr marL="285750" indent="-285750" algn="l">
+              <a:buFont typeface="Arial" panose="020B0604020202020204" pitchFamily="34" charset="0"/>
+              <a:buChar char="•"/>
+            </a:pPr>
+            <a:r>
+              <a:rPr lang="en-GB" dirty="0" err="1" smtClean="0"/>
+              <a:t>Hashmap</a:t>
+            </a:r>
+            <a:r>
+              <a:rPr lang="en-GB" dirty="0" smtClean="0"/>
+              <a:t> &lt;item, shelf&gt;</a:t>
+            </a:r>
+          </a:p>
+          <a:p>
+            <a:pPr marL="285750" indent="-285750" algn="l">
+              <a:buFont typeface="Arial" panose="020B0604020202020204" pitchFamily="34" charset="0"/>
+              <a:buChar char="•"/>
+            </a:pPr>
+            <a:r>
+              <a:rPr lang="en-GB" dirty="0" smtClean="0"/>
+              <a:t>No fixed order</a:t>
+            </a:r>
+          </a:p>
+        </p:txBody>
+      </p:sp>
+      <p:pic>
+        <p:nvPicPr>
+          <p:cNvPr id="4" name="Grafik 3"/>
+          <p:cNvPicPr>
+            <a:picLocks noChangeAspect="1"/>
+          </p:cNvPicPr>
+          <p:nvPr/>
+        </p:nvPicPr>
+        <p:blipFill>
+          <a:blip r:embed="rId2">
+            <a:extLst>
+              <a:ext uri="{28A0092B-C50C-407E-A947-70E740481C1C}">
+                <a14:useLocalDpi xmlns:a14="http://schemas.microsoft.com/office/drawing/2010/main" val="0"/>
+              </a:ext>
+            </a:extLst>
+          </a:blip>
+          <a:stretch>
+            <a:fillRect/>
+          </a:stretch>
+        </p:blipFill>
+        <p:spPr>
+          <a:xfrm>
+            <a:off x="6433807" y="706518"/>
+            <a:ext cx="3812299" cy="5801325"/>
+          </a:xfrm>
+          <a:prstGeom prst="rect">
+            <a:avLst/>
+          </a:prstGeom>
+          <a:ln>
+            <a:noFill/>
+          </a:ln>
+          <a:effectLst>
+            <a:softEdge rad="112500"/>
+          </a:effectLst>
+        </p:spPr>
+      </p:pic>
+    </p:spTree>
+    <p:extLst>
+      <p:ext uri="{BB962C8B-B14F-4D97-AF65-F5344CB8AC3E}">
+        <p14:creationId xmlns:p14="http://schemas.microsoft.com/office/powerpoint/2010/main" val="3556116458"/>
+      </p:ext>
+    </p:extLst>
+  </p:cSld>
+  <p:clrMapOvr>
+    <a:masterClrMapping/>
+  </p:clrMapOvr>
+  <p:timing>
+    <p:tnLst>
+      <p:par>
+        <p:cTn id="1" dur="indefinite" restart="never" nodeType="tmRoot"/>
+      </p:par>
+    </p:tnLst>
+  </p:timing>
+</p:sld>
+</file>
+
+<file path=ppt/slides/slide8.xml><?xml version="1.0" encoding="utf-8"?>
+<p:sld xmlns:a="http://schemas.openxmlformats.org/drawingml/2006/main" xmlns:r="http://schemas.openxmlformats.org/officeDocument/2006/relationships" xmlns:p="http://schemas.openxmlformats.org/presentationml/2006/main">
+  <p:cSld>
+    <p:spTree>
+      <p:nvGrpSpPr>
+        <p:cNvPr id="1" name=""/>
+        <p:cNvGrpSpPr/>
+        <p:nvPr/>
+      </p:nvGrpSpPr>
+      <p:grpSpPr>
+        <a:xfrm>
+          <a:off x="0" y="0"/>
+          <a:ext cx="0" cy="0"/>
+          <a:chOff x="0" y="0"/>
+          <a:chExt cx="0" cy="0"/>
+        </a:xfrm>
+      </p:grpSpPr>
+      <p:sp>
+        <p:nvSpPr>
+          <p:cNvPr id="2" name="Titel 1"/>
+          <p:cNvSpPr>
+            <a:spLocks noGrp="1"/>
+          </p:cNvSpPr>
+          <p:nvPr>
+            <p:ph type="title"/>
+          </p:nvPr>
+        </p:nvSpPr>
+        <p:spPr>
+          <a:xfrm>
+            <a:off x="4684711" y="867102"/>
+            <a:ext cx="3549121" cy="859221"/>
+          </a:xfrm>
+        </p:spPr>
+        <p:txBody>
+          <a:bodyPr/>
+          <a:lstStyle/>
+          <a:p>
+            <a:r>
+              <a:rPr lang="de-DE" sz="3600" dirty="0" err="1" smtClean="0"/>
+              <a:t>Orderpicker</a:t>
+            </a:r>
+            <a:endParaRPr lang="en-GB" dirty="0"/>
+          </a:p>
+        </p:txBody>
+      </p:sp>
+      <p:sp>
+        <p:nvSpPr>
+          <p:cNvPr id="12" name="Textplatzhalter 11"/>
+          <p:cNvSpPr>
+            <a:spLocks noGrp="1"/>
+          </p:cNvSpPr>
+          <p:nvPr>
+            <p:ph type="body" sz="half" idx="2"/>
+          </p:nvPr>
+        </p:nvSpPr>
+        <p:spPr>
+          <a:xfrm>
+            <a:off x="1484312" y="1891861"/>
+            <a:ext cx="9898391" cy="4351283"/>
+          </a:xfrm>
+        </p:spPr>
+        <p:txBody>
+          <a:bodyPr anchor="t">
+            <a:normAutofit/>
+          </a:bodyPr>
+          <a:lstStyle/>
+          <a:p>
+            <a:pPr algn="l"/>
+            <a:r>
+              <a:rPr lang="en-GB" sz="2200" dirty="0" smtClean="0"/>
+              <a:t>Control flow</a:t>
+            </a:r>
+          </a:p>
+          <a:p>
+            <a:pPr marL="285750" indent="-285750" algn="l">
+              <a:buFont typeface="Arial" panose="020B0604020202020204" pitchFamily="34" charset="0"/>
+              <a:buChar char="•"/>
+            </a:pPr>
+            <a:r>
+              <a:rPr lang="en-GB" sz="2200" dirty="0" smtClean="0"/>
+              <a:t>Processing the order can fail</a:t>
+            </a:r>
+          </a:p>
+          <a:p>
+            <a:pPr marL="742950" lvl="1" indent="-285750">
+              <a:buFont typeface="Arial" panose="020B0604020202020204" pitchFamily="34" charset="0"/>
+              <a:buChar char="•"/>
+            </a:pPr>
+            <a:r>
+              <a:rPr lang="en-GB" sz="2200" dirty="0" smtClean="0"/>
+              <a:t>No </a:t>
+            </a:r>
+            <a:r>
+              <a:rPr lang="en-GB" sz="2200" dirty="0" err="1" smtClean="0"/>
+              <a:t>shelfs</a:t>
+            </a:r>
+            <a:r>
+              <a:rPr lang="en-GB" sz="2200" dirty="0" smtClean="0"/>
+              <a:t> instantiated, all </a:t>
+            </a:r>
+            <a:r>
+              <a:rPr lang="en-GB" sz="2200" dirty="0" err="1" smtClean="0"/>
+              <a:t>shelfs</a:t>
+            </a:r>
+            <a:r>
+              <a:rPr lang="en-GB" sz="2200" dirty="0" smtClean="0"/>
+              <a:t> busy, </a:t>
+            </a:r>
+            <a:r>
+              <a:rPr lang="en-GB" sz="2200" dirty="0" err="1" smtClean="0"/>
+              <a:t>shelfs</a:t>
+            </a:r>
+            <a:r>
+              <a:rPr lang="en-GB" sz="2200" dirty="0" smtClean="0"/>
+              <a:t> are empty, “reject proposal”</a:t>
+            </a:r>
+          </a:p>
+          <a:p>
+            <a:pPr marL="285750" indent="-285750" algn="l">
+              <a:buFont typeface="Arial" panose="020B0604020202020204" pitchFamily="34" charset="0"/>
+              <a:buChar char="•"/>
+            </a:pPr>
+            <a:r>
+              <a:rPr lang="en-GB" sz="2200" dirty="0" smtClean="0"/>
+              <a:t>Broadcast missing items again (ticker behaviour)</a:t>
+            </a:r>
+          </a:p>
+          <a:p>
+            <a:pPr marL="285750" indent="-285750" algn="l">
+              <a:buFont typeface="Arial" panose="020B0604020202020204" pitchFamily="34" charset="0"/>
+              <a:buChar char="•"/>
+            </a:pPr>
+            <a:r>
+              <a:rPr lang="en-GB" sz="2200" dirty="0" smtClean="0"/>
+              <a:t>Immediately rebroadcast items after receiving “reject proposal”</a:t>
+            </a:r>
+          </a:p>
+          <a:p>
+            <a:pPr marL="285750" indent="-285750" algn="l">
+              <a:buFont typeface="Arial" panose="020B0604020202020204" pitchFamily="34" charset="0"/>
+              <a:buChar char="•"/>
+            </a:pPr>
+            <a:r>
+              <a:rPr lang="en-GB" sz="2200" dirty="0"/>
+              <a:t>Abort the order after several broadcasts (timeout)</a:t>
+            </a:r>
+          </a:p>
+          <a:p>
+            <a:pPr marL="285750" indent="-285750" algn="l">
+              <a:buFont typeface="Arial" panose="020B0604020202020204" pitchFamily="34" charset="0"/>
+              <a:buChar char="•"/>
+            </a:pPr>
+            <a:r>
+              <a:rPr lang="en-GB" sz="2200" dirty="0" smtClean="0"/>
+              <a:t>Return incomplete order to </a:t>
+            </a:r>
+            <a:r>
+              <a:rPr lang="en-GB" sz="2200" dirty="0" err="1" smtClean="0"/>
+              <a:t>OrderAgent</a:t>
+            </a:r>
+            <a:r>
+              <a:rPr lang="en-GB" sz="2200" dirty="0" smtClean="0"/>
+              <a:t> (</a:t>
+            </a:r>
+            <a:r>
+              <a:rPr lang="en-GB" sz="2200" dirty="0" err="1" smtClean="0"/>
+              <a:t>ACLMessage.FAILURE</a:t>
+            </a:r>
+            <a:r>
+              <a:rPr lang="en-GB" sz="2200" dirty="0" smtClean="0"/>
+              <a:t>)</a:t>
+            </a:r>
+          </a:p>
+          <a:p>
+            <a:pPr marL="285750" indent="-285750" algn="l">
+              <a:buFont typeface="Arial" panose="020B0604020202020204" pitchFamily="34" charset="0"/>
+              <a:buChar char="•"/>
+            </a:pPr>
+            <a:r>
+              <a:rPr lang="en-GB" sz="2200" dirty="0" smtClean="0"/>
+              <a:t>Order is re-thrown into the system</a:t>
+            </a:r>
+          </a:p>
+        </p:txBody>
+      </p:sp>
+    </p:spTree>
+    <p:extLst>
+      <p:ext uri="{BB962C8B-B14F-4D97-AF65-F5344CB8AC3E}">
+        <p14:creationId xmlns:p14="http://schemas.microsoft.com/office/powerpoint/2010/main" val="1327784719"/>
+      </p:ext>
+    </p:extLst>
+  </p:cSld>
+  <p:clrMapOvr>
+    <a:masterClrMapping/>
+  </p:clrMapOvr>
+  <p:timing>
+    <p:tnLst>
+      <p:par>
+        <p:cTn id="1" dur="indefinite" restart="never" nodeType="tmRoot"/>
+      </p:par>
+    </p:tnLst>
+  </p:timing>
+</p:sld>
+</file>
+
+<file path=ppt/slides/slide9.xml><?xml version="1.0" encoding="utf-8"?>
+<p:sld xmlns:a="http://schemas.openxmlformats.org/drawingml/2006/main" xmlns:r="http://schemas.openxmlformats.org/officeDocument/2006/relationships" xmlns:p="http://schemas.openxmlformats.org/presentationml/2006/main">
+  <p:cSld>
+    <p:spTree>
+      <p:nvGrpSpPr>
+        <p:cNvPr id="1" name=""/>
+        <p:cNvGrpSpPr/>
+        <p:nvPr/>
+      </p:nvGrpSpPr>
+      <p:grpSpPr>
+        <a:xfrm>
+          <a:off x="0" y="0"/>
+          <a:ext cx="0" cy="0"/>
+          <a:chOff x="0" y="0"/>
+          <a:chExt cx="0" cy="0"/>
+        </a:xfrm>
+      </p:grpSpPr>
+      <p:sp>
+        <p:nvSpPr>
+          <p:cNvPr id="2" name="Titel 1"/>
+          <p:cNvSpPr>
+            <a:spLocks noGrp="1"/>
+          </p:cNvSpPr>
+          <p:nvPr>
+            <p:ph type="title"/>
+          </p:nvPr>
+        </p:nvSpPr>
+        <p:spPr/>
+        <p:txBody>
+          <a:bodyPr/>
+          <a:lstStyle/>
+          <a:p>
+            <a:r>
               <a:rPr lang="de-DE" dirty="0" smtClean="0"/>
               <a:t>Monitoring</a:t>
             </a:r>
@@ -7836,371 +8959,6 @@
     <p:extLst>
       <p:ext uri="{BB962C8B-B14F-4D97-AF65-F5344CB8AC3E}">
         <p14:creationId xmlns:p14="http://schemas.microsoft.com/office/powerpoint/2010/main" val="1585716950"/>
-      </p:ext>
-    </p:extLst>
-  </p:cSld>
-  <p:clrMapOvr>
-    <a:masterClrMapping/>
-  </p:clrMapOvr>
-  <p:timing>
-    <p:tnLst>
-      <p:par>
-        <p:cTn id="1" dur="indefinite" restart="never" nodeType="tmRoot"/>
-      </p:par>
-    </p:tnLst>
-  </p:timing>
-</p:sld>
-</file>
-
-<file path=ppt/slides/slide8.xml><?xml version="1.0" encoding="utf-8"?>
-<p:sld xmlns:a="http://schemas.openxmlformats.org/drawingml/2006/main" xmlns:r="http://schemas.openxmlformats.org/officeDocument/2006/relationships" xmlns:p="http://schemas.openxmlformats.org/presentationml/2006/main">
-  <p:cSld>
-    <p:spTree>
-      <p:nvGrpSpPr>
-        <p:cNvPr id="1" name=""/>
-        <p:cNvGrpSpPr/>
-        <p:nvPr/>
-      </p:nvGrpSpPr>
-      <p:grpSpPr>
-        <a:xfrm>
-          <a:off x="0" y="0"/>
-          <a:ext cx="0" cy="0"/>
-          <a:chOff x="0" y="0"/>
-          <a:chExt cx="0" cy="0"/>
-        </a:xfrm>
-      </p:grpSpPr>
-      <p:sp>
-        <p:nvSpPr>
-          <p:cNvPr id="2" name="Titel 1"/>
-          <p:cNvSpPr>
-            <a:spLocks noGrp="1"/>
-          </p:cNvSpPr>
-          <p:nvPr>
-            <p:ph type="title"/>
-          </p:nvPr>
-        </p:nvSpPr>
-        <p:spPr/>
-        <p:txBody>
-          <a:bodyPr/>
-          <a:lstStyle/>
-          <a:p>
-            <a:r>
-              <a:rPr lang="de-DE" dirty="0" err="1" smtClean="0"/>
-              <a:t>Configuration</a:t>
-            </a:r>
-            <a:endParaRPr lang="en-GB" dirty="0"/>
-          </a:p>
-        </p:txBody>
-      </p:sp>
-      <p:sp>
-        <p:nvSpPr>
-          <p:cNvPr id="3" name="Inhaltsplatzhalter 2"/>
-          <p:cNvSpPr>
-            <a:spLocks noGrp="1"/>
-          </p:cNvSpPr>
-          <p:nvPr>
-            <p:ph idx="1"/>
-          </p:nvPr>
-        </p:nvSpPr>
-        <p:spPr/>
-        <p:txBody>
-          <a:bodyPr>
-            <a:normAutofit lnSpcReduction="10000"/>
-          </a:bodyPr>
-          <a:lstStyle/>
-          <a:p>
-            <a:pPr marL="0" indent="0">
-              <a:buNone/>
-            </a:pPr>
-            <a:r>
-              <a:rPr lang="de-DE" dirty="0" smtClean="0"/>
-              <a:t>{</a:t>
-            </a:r>
-          </a:p>
-          <a:p>
-            <a:pPr marL="0" indent="0">
-              <a:buNone/>
-            </a:pPr>
-            <a:r>
-              <a:rPr lang="de-DE" dirty="0"/>
-              <a:t>	</a:t>
-            </a:r>
-            <a:r>
-              <a:rPr lang="de-DE" dirty="0" err="1" smtClean="0"/>
-              <a:t>shelves</a:t>
-            </a:r>
-            <a:r>
-              <a:rPr lang="de-DE" dirty="0" smtClean="0"/>
-              <a:t>: [ {uid:0, </a:t>
-            </a:r>
-            <a:r>
-              <a:rPr lang="de-DE" dirty="0" err="1" smtClean="0"/>
-              <a:t>products</a:t>
-            </a:r>
-            <a:r>
-              <a:rPr lang="de-DE" dirty="0" smtClean="0"/>
-              <a:t>:[</a:t>
-            </a:r>
-          </a:p>
-          <a:p>
-            <a:pPr marL="0" indent="0">
-              <a:buNone/>
-            </a:pPr>
-            <a:r>
-              <a:rPr lang="de-DE" dirty="0"/>
-              <a:t>	</a:t>
-            </a:r>
-            <a:r>
-              <a:rPr lang="de-DE" dirty="0" smtClean="0"/>
-              <a:t>	{name:“</a:t>
-            </a:r>
-            <a:r>
-              <a:rPr lang="de-DE" dirty="0" err="1" smtClean="0"/>
-              <a:t>x“,stock</a:t>
-            </a:r>
-            <a:r>
-              <a:rPr lang="de-DE" dirty="0" smtClean="0"/>
-              <a:t>:{current:10}},</a:t>
-            </a:r>
-          </a:p>
-          <a:p>
-            <a:pPr marL="0" indent="0">
-              <a:buNone/>
-            </a:pPr>
-            <a:r>
-              <a:rPr lang="de-DE" dirty="0"/>
-              <a:t>	</a:t>
-            </a:r>
-            <a:r>
-              <a:rPr lang="de-DE" dirty="0" smtClean="0"/>
-              <a:t>	{</a:t>
-            </a:r>
-            <a:r>
-              <a:rPr lang="de-DE" dirty="0" err="1" smtClean="0"/>
-              <a:t>name</a:t>
-            </a:r>
-            <a:r>
-              <a:rPr lang="de-DE" dirty="0" smtClean="0"/>
-              <a:t>:“</a:t>
-            </a:r>
-            <a:r>
-              <a:rPr lang="de-DE" dirty="0" err="1" smtClean="0"/>
-              <a:t>y“,stock</a:t>
-            </a:r>
-            <a:r>
-              <a:rPr lang="de-DE" dirty="0" smtClean="0"/>
-              <a:t>:{current:10}}</a:t>
-            </a:r>
-          </a:p>
-          <a:p>
-            <a:pPr marL="0" indent="0">
-              <a:buNone/>
-            </a:pPr>
-            <a:r>
-              <a:rPr lang="de-DE" dirty="0"/>
-              <a:t>	</a:t>
-            </a:r>
-            <a:r>
-              <a:rPr lang="de-DE" dirty="0" smtClean="0"/>
-              <a:t>]}],</a:t>
-            </a:r>
-          </a:p>
-          <a:p>
-            <a:pPr marL="0" indent="0">
-              <a:buNone/>
-            </a:pPr>
-            <a:r>
-              <a:rPr lang="de-DE" dirty="0"/>
-              <a:t>	</a:t>
-            </a:r>
-            <a:r>
-              <a:rPr lang="de-DE" dirty="0" err="1" smtClean="0"/>
-              <a:t>pickers</a:t>
-            </a:r>
-            <a:r>
-              <a:rPr lang="de-DE" dirty="0" smtClean="0"/>
-              <a:t>: [{uid:0}, {uid:1}],</a:t>
-            </a:r>
-          </a:p>
-          <a:p>
-            <a:pPr marL="0" indent="0">
-              <a:buNone/>
-            </a:pPr>
-            <a:r>
-              <a:rPr lang="de-DE" dirty="0"/>
-              <a:t>	</a:t>
-            </a:r>
-            <a:r>
-              <a:rPr lang="de-DE" dirty="0" err="1" smtClean="0"/>
-              <a:t>robots</a:t>
-            </a:r>
-            <a:r>
-              <a:rPr lang="de-DE" dirty="0" smtClean="0"/>
-              <a:t>: [{uid:0}, {uid:1}],</a:t>
-            </a:r>
-          </a:p>
-          <a:p>
-            <a:pPr marL="0" indent="0">
-              <a:buNone/>
-            </a:pPr>
-            <a:r>
-              <a:rPr lang="de-DE" dirty="0"/>
-              <a:t>	</a:t>
-            </a:r>
-            <a:r>
-              <a:rPr lang="de-DE" dirty="0" err="1" smtClean="0"/>
-              <a:t>orders</a:t>
-            </a:r>
-            <a:r>
-              <a:rPr lang="de-DE" dirty="0" smtClean="0"/>
-              <a:t>: [{uid:0, </a:t>
-            </a:r>
-            <a:r>
-              <a:rPr lang="de-DE" dirty="0" err="1" smtClean="0"/>
-              <a:t>products</a:t>
-            </a:r>
-            <a:r>
-              <a:rPr lang="de-DE" dirty="0" smtClean="0"/>
-              <a:t>:[</a:t>
-            </a:r>
-          </a:p>
-          <a:p>
-            <a:pPr marL="0" indent="0">
-              <a:buNone/>
-            </a:pPr>
-            <a:r>
-              <a:rPr lang="de-DE" dirty="0"/>
-              <a:t>	</a:t>
-            </a:r>
-            <a:r>
-              <a:rPr lang="de-DE" dirty="0" smtClean="0"/>
-              <a:t>	{</a:t>
-            </a:r>
-            <a:r>
-              <a:rPr lang="de-DE" dirty="0" err="1" smtClean="0"/>
-              <a:t>name</a:t>
-            </a:r>
-            <a:r>
-              <a:rPr lang="de-DE" dirty="0" smtClean="0"/>
-              <a:t>:“x“, quantity:1},</a:t>
-            </a:r>
-          </a:p>
-          <a:p>
-            <a:pPr marL="0" indent="0">
-              <a:buNone/>
-            </a:pPr>
-            <a:r>
-              <a:rPr lang="de-DE" dirty="0"/>
-              <a:t>	</a:t>
-            </a:r>
-            <a:r>
-              <a:rPr lang="de-DE" dirty="0" smtClean="0"/>
-              <a:t>	{</a:t>
-            </a:r>
-            <a:r>
-              <a:rPr lang="de-DE" dirty="0" err="1" smtClean="0"/>
-              <a:t>name</a:t>
-            </a:r>
-            <a:r>
-              <a:rPr lang="de-DE" dirty="0" smtClean="0"/>
-              <a:t>:“y“, quantity:3}</a:t>
-            </a:r>
-          </a:p>
-          <a:p>
-            <a:pPr marL="0" indent="0">
-              <a:buNone/>
-            </a:pPr>
-            <a:r>
-              <a:rPr lang="de-DE" dirty="0"/>
-              <a:t>	</a:t>
-            </a:r>
-            <a:r>
-              <a:rPr lang="de-DE" dirty="0" smtClean="0"/>
-              <a:t>]}]</a:t>
-            </a:r>
-          </a:p>
-          <a:p>
-            <a:pPr marL="0" indent="0">
-              <a:buNone/>
-            </a:pPr>
-            <a:r>
-              <a:rPr lang="de-DE" dirty="0"/>
-              <a:t>}</a:t>
-            </a:r>
-            <a:endParaRPr lang="en-GB" dirty="0"/>
-          </a:p>
-        </p:txBody>
-      </p:sp>
-      <p:sp>
-        <p:nvSpPr>
-          <p:cNvPr id="4" name="Textplatzhalter 3"/>
-          <p:cNvSpPr>
-            <a:spLocks noGrp="1"/>
-          </p:cNvSpPr>
-          <p:nvPr>
-            <p:ph type="body" sz="half" idx="2"/>
-          </p:nvPr>
-        </p:nvSpPr>
-        <p:spPr/>
-        <p:txBody>
-          <a:bodyPr/>
-          <a:lstStyle/>
-          <a:p>
-            <a:pPr marL="285750" indent="-285750" algn="l">
-              <a:buFont typeface="Arial" panose="020B0604020202020204" pitchFamily="34" charset="0"/>
-              <a:buChar char="•"/>
-            </a:pPr>
-            <a:r>
-              <a:rPr lang="de-DE" dirty="0" err="1" smtClean="0"/>
-              <a:t>Define</a:t>
-            </a:r>
-            <a:r>
-              <a:rPr lang="de-DE" dirty="0" smtClean="0"/>
-              <a:t> </a:t>
-            </a:r>
-            <a:r>
-              <a:rPr lang="de-DE" dirty="0" err="1" smtClean="0"/>
-              <a:t>kiva.config.json</a:t>
-            </a:r>
-            <a:endParaRPr lang="de-DE" dirty="0"/>
-          </a:p>
-          <a:p>
-            <a:pPr marL="285750" indent="-285750" algn="l">
-              <a:buFont typeface="Arial" panose="020B0604020202020204" pitchFamily="34" charset="0"/>
-              <a:buChar char="•"/>
-            </a:pPr>
-            <a:r>
-              <a:rPr lang="de-DE" dirty="0" smtClean="0"/>
-              <a:t>Execute parse.js </a:t>
-            </a:r>
-            <a:r>
-              <a:rPr lang="de-DE" dirty="0" err="1" smtClean="0"/>
-              <a:t>to</a:t>
-            </a:r>
-            <a:r>
-              <a:rPr lang="de-DE" dirty="0" smtClean="0"/>
-              <a:t> </a:t>
-            </a:r>
-            <a:r>
-              <a:rPr lang="de-DE" dirty="0" err="1" smtClean="0"/>
-              <a:t>get</a:t>
-            </a:r>
-            <a:r>
-              <a:rPr lang="de-DE" dirty="0" smtClean="0"/>
-              <a:t> JADE </a:t>
-            </a:r>
-            <a:r>
-              <a:rPr lang="de-DE" dirty="0" err="1" smtClean="0"/>
-              <a:t>call</a:t>
-            </a:r>
-            <a:endParaRPr lang="en-GB" dirty="0"/>
-          </a:p>
-        </p:txBody>
-      </p:sp>
-    </p:spTree>
-    <p:extLst>
-      <p:ext uri="{BB962C8B-B14F-4D97-AF65-F5344CB8AC3E}">
-        <p14:creationId xmlns:p14="http://schemas.microsoft.com/office/powerpoint/2010/main" val="1592845727"/>
       </p:ext>
     </p:extLst>
   </p:cSld>
@@ -8260,7 +9018,7 @@
     </a:clrScheme>
     <a:fontScheme name="Parallax">
       <a:majorFont>
-        <a:latin typeface="Corbel" panose="020B0503020204020204"/>
+        <a:latin typeface="Corbel"/>
         <a:ea typeface=""/>
         <a:cs typeface=""/>
         <a:font script="Jpan" typeface="HGｺﾞｼｯｸM"/>
@@ -8295,7 +9053,7 @@
         <a:font script="Geor" typeface="Sylfaen"/>
       </a:majorFont>
       <a:minorFont>
-        <a:latin typeface="Corbel" panose="020B0503020204020204"/>
+        <a:latin typeface="Corbel"/>
         <a:ea typeface=""/>
         <a:cs typeface=""/>
         <a:font script="Jpan" typeface="HGｺﾞｼｯｸM"/>
@@ -8467,7 +9225,7 @@
   <a:extraClrSchemeLst/>
   <a:extLst>
     <a:ext uri="{05A4C25C-085E-4340-85A3-A5531E510DB2}">
-      <thm15:themeFamily xmlns:thm15="http://schemas.microsoft.com/office/thememl/2012/main" name="Parallax" id="{3388167B-A2EB-4685-9635-1831D9AEF8C4}" vid="{4F7A876A-7598-49CA-AFC8-8EDA2551E4A7}"/>
+      <thm15:themeFamily xmlns:thm15="http://schemas.microsoft.com/office/thememl/2012/main" xmlns="" name="Parallax" id="{3388167B-A2EB-4685-9635-1831D9AEF8C4}" vid="{4F7A876A-7598-49CA-AFC8-8EDA2551E4A7}"/>
     </a:ext>
   </a:extLst>
 </a:theme>

</xml_diff>